<commit_message>
end of day-3 code
</commit_message>
<xml_diff>
--- a/Application Architecture.pptx
+++ b/Application Architecture.pptx
@@ -6,9 +6,21 @@
   </p:sldMasterIdLst>
   <p:sldIdLst>
     <p:sldId id="256" r:id="rId2"/>
-    <p:sldId id="257" r:id="rId3"/>
-    <p:sldId id="258" r:id="rId4"/>
-    <p:sldId id="259" r:id="rId5"/>
+    <p:sldId id="261" r:id="rId3"/>
+    <p:sldId id="260" r:id="rId4"/>
+    <p:sldId id="257" r:id="rId5"/>
+    <p:sldId id="258" r:id="rId6"/>
+    <p:sldId id="259" r:id="rId7"/>
+    <p:sldId id="262" r:id="rId8"/>
+    <p:sldId id="263" r:id="rId9"/>
+    <p:sldId id="264" r:id="rId10"/>
+    <p:sldId id="265" r:id="rId11"/>
+    <p:sldId id="270" r:id="rId12"/>
+    <p:sldId id="271" r:id="rId13"/>
+    <p:sldId id="266" r:id="rId14"/>
+    <p:sldId id="269" r:id="rId15"/>
+    <p:sldId id="272" r:id="rId16"/>
+    <p:sldId id="273" r:id="rId17"/>
   </p:sldIdLst>
   <p:sldSz cx="12192000" cy="6858000"/>
   <p:notesSz cx="6858000" cy="9144000"/>
@@ -107,6 +119,11 @@
       </a:defRPr>
     </a:lvl9pPr>
   </p:defaultTextStyle>
+  <p:extLst>
+    <p:ext uri="{EFAFB233-063F-42B5-8137-9DF3F51BA10A}">
+      <p15:sldGuideLst xmlns:p15="http://schemas.microsoft.com/office/powerpoint/2012/main"/>
+    </p:ext>
+  </p:extLst>
 </p:presentation>
 </file>
 
@@ -832,7 +849,7 @@
           <a:p>
             <a:fld id="{F4A41FB3-2679-4A82-AE97-691C292D26B0}" type="datetimeFigureOut">
               <a:rPr lang="en-US" smtClean="0"/>
-              <a:t>8/21/2020</a:t>
+              <a:t>8/28/2020</a:t>
             </a:fld>
             <a:endParaRPr lang="en-US"/>
           </a:p>
@@ -1083,7 +1100,7 @@
           <a:p>
             <a:fld id="{F4A41FB3-2679-4A82-AE97-691C292D26B0}" type="datetimeFigureOut">
               <a:rPr lang="en-US" smtClean="0"/>
-              <a:t>8/21/2020</a:t>
+              <a:t>8/28/2020</a:t>
             </a:fld>
             <a:endParaRPr lang="en-US"/>
           </a:p>
@@ -1397,7 +1414,7 @@
           <a:p>
             <a:fld id="{F4A41FB3-2679-4A82-AE97-691C292D26B0}" type="datetimeFigureOut">
               <a:rPr lang="en-US" smtClean="0"/>
-              <a:t>8/21/2020</a:t>
+              <a:t>8/28/2020</a:t>
             </a:fld>
             <a:endParaRPr lang="en-US"/>
           </a:p>
@@ -1738,7 +1755,7 @@
           <a:p>
             <a:fld id="{F4A41FB3-2679-4A82-AE97-691C292D26B0}" type="datetimeFigureOut">
               <a:rPr lang="en-US" smtClean="0"/>
-              <a:t>8/21/2020</a:t>
+              <a:t>8/28/2020</a:t>
             </a:fld>
             <a:endParaRPr lang="en-US"/>
           </a:p>
@@ -2052,7 +2069,7 @@
           <a:p>
             <a:fld id="{F4A41FB3-2679-4A82-AE97-691C292D26B0}" type="datetimeFigureOut">
               <a:rPr lang="en-US" smtClean="0"/>
-              <a:t>8/21/2020</a:t>
+              <a:t>8/28/2020</a:t>
             </a:fld>
             <a:endParaRPr lang="en-US"/>
           </a:p>
@@ -2445,7 +2462,7 @@
           <a:p>
             <a:fld id="{F4A41FB3-2679-4A82-AE97-691C292D26B0}" type="datetimeFigureOut">
               <a:rPr lang="en-US" smtClean="0"/>
-              <a:t>8/21/2020</a:t>
+              <a:t>8/28/2020</a:t>
             </a:fld>
             <a:endParaRPr lang="en-US"/>
           </a:p>
@@ -2615,7 +2632,7 @@
           <a:p>
             <a:fld id="{F4A41FB3-2679-4A82-AE97-691C292D26B0}" type="datetimeFigureOut">
               <a:rPr lang="en-US" smtClean="0"/>
-              <a:t>8/21/2020</a:t>
+              <a:t>8/28/2020</a:t>
             </a:fld>
             <a:endParaRPr lang="en-US"/>
           </a:p>
@@ -2795,7 +2812,7 @@
           <a:p>
             <a:fld id="{F4A41FB3-2679-4A82-AE97-691C292D26B0}" type="datetimeFigureOut">
               <a:rPr lang="en-US" smtClean="0"/>
-              <a:t>8/21/2020</a:t>
+              <a:t>8/28/2020</a:t>
             </a:fld>
             <a:endParaRPr lang="en-US"/>
           </a:p>
@@ -2971,7 +2988,7 @@
           <a:p>
             <a:fld id="{F4A41FB3-2679-4A82-AE97-691C292D26B0}" type="datetimeFigureOut">
               <a:rPr lang="en-US" smtClean="0"/>
-              <a:t>8/21/2020</a:t>
+              <a:t>8/28/2020</a:t>
             </a:fld>
             <a:endParaRPr lang="en-US"/>
           </a:p>
@@ -3218,7 +3235,7 @@
           <a:p>
             <a:fld id="{F4A41FB3-2679-4A82-AE97-691C292D26B0}" type="datetimeFigureOut">
               <a:rPr lang="en-US" smtClean="0"/>
-              <a:t>8/21/2020</a:t>
+              <a:t>8/28/2020</a:t>
             </a:fld>
             <a:endParaRPr lang="en-US"/>
           </a:p>
@@ -3450,7 +3467,7 @@
           <a:p>
             <a:fld id="{F4A41FB3-2679-4A82-AE97-691C292D26B0}" type="datetimeFigureOut">
               <a:rPr lang="en-US" smtClean="0"/>
-              <a:t>8/21/2020</a:t>
+              <a:t>8/28/2020</a:t>
             </a:fld>
             <a:endParaRPr lang="en-US"/>
           </a:p>
@@ -3824,7 +3841,7 @@
           <a:p>
             <a:fld id="{F4A41FB3-2679-4A82-AE97-691C292D26B0}" type="datetimeFigureOut">
               <a:rPr lang="en-US" smtClean="0"/>
-              <a:t>8/21/2020</a:t>
+              <a:t>8/28/2020</a:t>
             </a:fld>
             <a:endParaRPr lang="en-US"/>
           </a:p>
@@ -3947,7 +3964,7 @@
           <a:p>
             <a:fld id="{F4A41FB3-2679-4A82-AE97-691C292D26B0}" type="datetimeFigureOut">
               <a:rPr lang="en-US" smtClean="0"/>
-              <a:t>8/21/2020</a:t>
+              <a:t>8/28/2020</a:t>
             </a:fld>
             <a:endParaRPr lang="en-US"/>
           </a:p>
@@ -4042,7 +4059,7 @@
           <a:p>
             <a:fld id="{F4A41FB3-2679-4A82-AE97-691C292D26B0}" type="datetimeFigureOut">
               <a:rPr lang="en-US" smtClean="0"/>
-              <a:t>8/21/2020</a:t>
+              <a:t>8/28/2020</a:t>
             </a:fld>
             <a:endParaRPr lang="en-US"/>
           </a:p>
@@ -4297,7 +4314,7 @@
           <a:p>
             <a:fld id="{F4A41FB3-2679-4A82-AE97-691C292D26B0}" type="datetimeFigureOut">
               <a:rPr lang="en-US" smtClean="0"/>
-              <a:t>8/21/2020</a:t>
+              <a:t>8/28/2020</a:t>
             </a:fld>
             <a:endParaRPr lang="en-US"/>
           </a:p>
@@ -4560,7 +4577,7 @@
           <a:p>
             <a:fld id="{F4A41FB3-2679-4A82-AE97-691C292D26B0}" type="datetimeFigureOut">
               <a:rPr lang="en-US" smtClean="0"/>
-              <a:t>8/21/2020</a:t>
+              <a:t>8/28/2020</a:t>
             </a:fld>
             <a:endParaRPr lang="en-US"/>
           </a:p>
@@ -5303,7 +5320,7 @@
           <a:p>
             <a:fld id="{F4A41FB3-2679-4A82-AE97-691C292D26B0}" type="datetimeFigureOut">
               <a:rPr lang="en-US" smtClean="0"/>
-              <a:t>8/21/2020</a:t>
+              <a:t>8/28/2020</a:t>
             </a:fld>
             <a:endParaRPr lang="en-US"/>
           </a:p>
@@ -5882,7 +5899,623 @@
 </p:sld>
 </file>
 
+<file path=ppt/slides/slide10.xml><?xml version="1.0" encoding="utf-8"?>
+<p:sld xmlns:a="http://schemas.openxmlformats.org/drawingml/2006/main" xmlns:r="http://schemas.openxmlformats.org/officeDocument/2006/relationships" xmlns:p="http://schemas.openxmlformats.org/presentationml/2006/main">
+  <p:cSld>
+    <p:spTree>
+      <p:nvGrpSpPr>
+        <p:cNvPr id="1" name=""/>
+        <p:cNvGrpSpPr/>
+        <p:nvPr/>
+      </p:nvGrpSpPr>
+      <p:grpSpPr>
+        <a:xfrm>
+          <a:off x="0" y="0"/>
+          <a:ext cx="0" cy="0"/>
+          <a:chOff x="0" y="0"/>
+          <a:chExt cx="0" cy="0"/>
+        </a:xfrm>
+      </p:grpSpPr>
+      <p:pic>
+        <p:nvPicPr>
+          <p:cNvPr id="2" name="Picture 1"/>
+          <p:cNvPicPr>
+            <a:picLocks noChangeAspect="1"/>
+          </p:cNvPicPr>
+          <p:nvPr/>
+        </p:nvPicPr>
+        <p:blipFill>
+          <a:blip r:embed="rId2"/>
+          <a:stretch>
+            <a:fillRect/>
+          </a:stretch>
+        </p:blipFill>
+        <p:spPr>
+          <a:xfrm>
+            <a:off x="1065012" y="1629944"/>
+            <a:ext cx="8077900" cy="3718882"/>
+          </a:xfrm>
+          <a:prstGeom prst="rect">
+            <a:avLst/>
+          </a:prstGeom>
+        </p:spPr>
+      </p:pic>
+    </p:spTree>
+    <p:extLst>
+      <p:ext uri="{BB962C8B-B14F-4D97-AF65-F5344CB8AC3E}">
+        <p14:creationId xmlns:p14="http://schemas.microsoft.com/office/powerpoint/2010/main" val="3989807056"/>
+      </p:ext>
+    </p:extLst>
+  </p:cSld>
+  <p:clrMapOvr>
+    <a:masterClrMapping/>
+  </p:clrMapOvr>
+</p:sld>
+</file>
+
+<file path=ppt/slides/slide11.xml><?xml version="1.0" encoding="utf-8"?>
+<p:sld xmlns:a="http://schemas.openxmlformats.org/drawingml/2006/main" xmlns:r="http://schemas.openxmlformats.org/officeDocument/2006/relationships" xmlns:p="http://schemas.openxmlformats.org/presentationml/2006/main">
+  <p:cSld>
+    <p:spTree>
+      <p:nvGrpSpPr>
+        <p:cNvPr id="1" name=""/>
+        <p:cNvGrpSpPr/>
+        <p:nvPr/>
+      </p:nvGrpSpPr>
+      <p:grpSpPr>
+        <a:xfrm>
+          <a:off x="0" y="0"/>
+          <a:ext cx="0" cy="0"/>
+          <a:chOff x="0" y="0"/>
+          <a:chExt cx="0" cy="0"/>
+        </a:xfrm>
+      </p:grpSpPr>
+      <p:pic>
+        <p:nvPicPr>
+          <p:cNvPr id="2" name="Picture 1"/>
+          <p:cNvPicPr>
+            <a:picLocks noChangeAspect="1"/>
+          </p:cNvPicPr>
+          <p:nvPr/>
+        </p:nvPicPr>
+        <p:blipFill>
+          <a:blip r:embed="rId2"/>
+          <a:stretch>
+            <a:fillRect/>
+          </a:stretch>
+        </p:blipFill>
+        <p:spPr>
+          <a:xfrm>
+            <a:off x="417995" y="500333"/>
+            <a:ext cx="10163383" cy="6081622"/>
+          </a:xfrm>
+          <a:prstGeom prst="rect">
+            <a:avLst/>
+          </a:prstGeom>
+        </p:spPr>
+      </p:pic>
+    </p:spTree>
+    <p:extLst>
+      <p:ext uri="{BB962C8B-B14F-4D97-AF65-F5344CB8AC3E}">
+        <p14:creationId xmlns:p14="http://schemas.microsoft.com/office/powerpoint/2010/main" val="420893576"/>
+      </p:ext>
+    </p:extLst>
+  </p:cSld>
+  <p:clrMapOvr>
+    <a:masterClrMapping/>
+  </p:clrMapOvr>
+  <p:timing>
+    <p:tnLst>
+      <p:par>
+        <p:cTn id="1" dur="indefinite" restart="never" nodeType="tmRoot"/>
+      </p:par>
+    </p:tnLst>
+  </p:timing>
+</p:sld>
+</file>
+
+<file path=ppt/slides/slide12.xml><?xml version="1.0" encoding="utf-8"?>
+<p:sld xmlns:a="http://schemas.openxmlformats.org/drawingml/2006/main" xmlns:r="http://schemas.openxmlformats.org/officeDocument/2006/relationships" xmlns:p="http://schemas.openxmlformats.org/presentationml/2006/main">
+  <p:cSld>
+    <p:spTree>
+      <p:nvGrpSpPr>
+        <p:cNvPr id="1" name=""/>
+        <p:cNvGrpSpPr/>
+        <p:nvPr/>
+      </p:nvGrpSpPr>
+      <p:grpSpPr>
+        <a:xfrm>
+          <a:off x="0" y="0"/>
+          <a:ext cx="0" cy="0"/>
+          <a:chOff x="0" y="0"/>
+          <a:chExt cx="0" cy="0"/>
+        </a:xfrm>
+      </p:grpSpPr>
+      <p:pic>
+        <p:nvPicPr>
+          <p:cNvPr id="2" name="Picture 1"/>
+          <p:cNvPicPr>
+            <a:picLocks noChangeAspect="1"/>
+          </p:cNvPicPr>
+          <p:nvPr/>
+        </p:nvPicPr>
+        <p:blipFill>
+          <a:blip r:embed="rId2"/>
+          <a:stretch>
+            <a:fillRect/>
+          </a:stretch>
+        </p:blipFill>
+        <p:spPr>
+          <a:xfrm>
+            <a:off x="524001" y="586596"/>
+            <a:ext cx="9775845" cy="5598544"/>
+          </a:xfrm>
+          <a:prstGeom prst="rect">
+            <a:avLst/>
+          </a:prstGeom>
+        </p:spPr>
+      </p:pic>
+    </p:spTree>
+    <p:extLst>
+      <p:ext uri="{BB962C8B-B14F-4D97-AF65-F5344CB8AC3E}">
+        <p14:creationId xmlns:p14="http://schemas.microsoft.com/office/powerpoint/2010/main" val="3939052706"/>
+      </p:ext>
+    </p:extLst>
+  </p:cSld>
+  <p:clrMapOvr>
+    <a:masterClrMapping/>
+  </p:clrMapOvr>
+  <p:timing>
+    <p:tnLst>
+      <p:par>
+        <p:cTn id="1" dur="indefinite" restart="never" nodeType="tmRoot"/>
+      </p:par>
+    </p:tnLst>
+  </p:timing>
+</p:sld>
+</file>
+
+<file path=ppt/slides/slide13.xml><?xml version="1.0" encoding="utf-8"?>
+<p:sld xmlns:a="http://schemas.openxmlformats.org/drawingml/2006/main" xmlns:r="http://schemas.openxmlformats.org/officeDocument/2006/relationships" xmlns:p="http://schemas.openxmlformats.org/presentationml/2006/main">
+  <p:cSld>
+    <p:spTree>
+      <p:nvGrpSpPr>
+        <p:cNvPr id="1" name=""/>
+        <p:cNvGrpSpPr/>
+        <p:nvPr/>
+      </p:nvGrpSpPr>
+      <p:grpSpPr>
+        <a:xfrm>
+          <a:off x="0" y="0"/>
+          <a:ext cx="0" cy="0"/>
+          <a:chOff x="0" y="0"/>
+          <a:chExt cx="0" cy="0"/>
+        </a:xfrm>
+      </p:grpSpPr>
+      <p:pic>
+        <p:nvPicPr>
+          <p:cNvPr id="2" name="Picture 1"/>
+          <p:cNvPicPr>
+            <a:picLocks noChangeAspect="1"/>
+          </p:cNvPicPr>
+          <p:nvPr/>
+        </p:nvPicPr>
+        <p:blipFill>
+          <a:blip r:embed="rId2"/>
+          <a:stretch>
+            <a:fillRect/>
+          </a:stretch>
+        </p:blipFill>
+        <p:spPr>
+          <a:xfrm>
+            <a:off x="548320" y="888521"/>
+            <a:ext cx="9113265" cy="5238607"/>
+          </a:xfrm>
+          <a:prstGeom prst="rect">
+            <a:avLst/>
+          </a:prstGeom>
+        </p:spPr>
+      </p:pic>
+    </p:spTree>
+    <p:extLst>
+      <p:ext uri="{BB962C8B-B14F-4D97-AF65-F5344CB8AC3E}">
+        <p14:creationId xmlns:p14="http://schemas.microsoft.com/office/powerpoint/2010/main" val="3260845812"/>
+      </p:ext>
+    </p:extLst>
+  </p:cSld>
+  <p:clrMapOvr>
+    <a:masterClrMapping/>
+  </p:clrMapOvr>
+</p:sld>
+</file>
+
+<file path=ppt/slides/slide14.xml><?xml version="1.0" encoding="utf-8"?>
+<p:sld xmlns:a="http://schemas.openxmlformats.org/drawingml/2006/main" xmlns:r="http://schemas.openxmlformats.org/officeDocument/2006/relationships" xmlns:p="http://schemas.openxmlformats.org/presentationml/2006/main">
+  <p:cSld>
+    <p:spTree>
+      <p:nvGrpSpPr>
+        <p:cNvPr id="1" name=""/>
+        <p:cNvGrpSpPr/>
+        <p:nvPr/>
+      </p:nvGrpSpPr>
+      <p:grpSpPr>
+        <a:xfrm>
+          <a:off x="0" y="0"/>
+          <a:ext cx="0" cy="0"/>
+          <a:chOff x="0" y="0"/>
+          <a:chExt cx="0" cy="0"/>
+        </a:xfrm>
+      </p:grpSpPr>
+      <p:pic>
+        <p:nvPicPr>
+          <p:cNvPr id="2" name="Picture 1"/>
+          <p:cNvPicPr>
+            <a:picLocks noChangeAspect="1"/>
+          </p:cNvPicPr>
+          <p:nvPr/>
+        </p:nvPicPr>
+        <p:blipFill>
+          <a:blip r:embed="rId2"/>
+          <a:stretch>
+            <a:fillRect/>
+          </a:stretch>
+        </p:blipFill>
+        <p:spPr>
+          <a:xfrm>
+            <a:off x="524454" y="966158"/>
+            <a:ext cx="10605247" cy="4692770"/>
+          </a:xfrm>
+          <a:prstGeom prst="rect">
+            <a:avLst/>
+          </a:prstGeom>
+        </p:spPr>
+      </p:pic>
+    </p:spTree>
+    <p:extLst>
+      <p:ext uri="{BB962C8B-B14F-4D97-AF65-F5344CB8AC3E}">
+        <p14:creationId xmlns:p14="http://schemas.microsoft.com/office/powerpoint/2010/main" val="1206089547"/>
+      </p:ext>
+    </p:extLst>
+  </p:cSld>
+  <p:clrMapOvr>
+    <a:masterClrMapping/>
+  </p:clrMapOvr>
+  <p:timing>
+    <p:tnLst>
+      <p:par>
+        <p:cTn id="1" dur="indefinite" restart="never" nodeType="tmRoot"/>
+      </p:par>
+    </p:tnLst>
+  </p:timing>
+</p:sld>
+</file>
+
+<file path=ppt/slides/slide15.xml><?xml version="1.0" encoding="utf-8"?>
+<p:sld xmlns:a="http://schemas.openxmlformats.org/drawingml/2006/main" xmlns:r="http://schemas.openxmlformats.org/officeDocument/2006/relationships" xmlns:p="http://schemas.openxmlformats.org/presentationml/2006/main">
+  <p:cSld>
+    <p:spTree>
+      <p:nvGrpSpPr>
+        <p:cNvPr id="1" name=""/>
+        <p:cNvGrpSpPr/>
+        <p:nvPr/>
+      </p:nvGrpSpPr>
+      <p:grpSpPr>
+        <a:xfrm>
+          <a:off x="0" y="0"/>
+          <a:ext cx="0" cy="0"/>
+          <a:chOff x="0" y="0"/>
+          <a:chExt cx="0" cy="0"/>
+        </a:xfrm>
+      </p:grpSpPr>
+      <p:pic>
+        <p:nvPicPr>
+          <p:cNvPr id="2" name="Picture 1"/>
+          <p:cNvPicPr>
+            <a:picLocks noChangeAspect="1"/>
+          </p:cNvPicPr>
+          <p:nvPr/>
+        </p:nvPicPr>
+        <p:blipFill>
+          <a:blip r:embed="rId2"/>
+          <a:stretch>
+            <a:fillRect/>
+          </a:stretch>
+        </p:blipFill>
+        <p:spPr>
+          <a:xfrm>
+            <a:off x="1349028" y="169097"/>
+            <a:ext cx="6949583" cy="6454325"/>
+          </a:xfrm>
+          <a:prstGeom prst="rect">
+            <a:avLst/>
+          </a:prstGeom>
+        </p:spPr>
+      </p:pic>
+    </p:spTree>
+    <p:extLst>
+      <p:ext uri="{BB962C8B-B14F-4D97-AF65-F5344CB8AC3E}">
+        <p14:creationId xmlns:p14="http://schemas.microsoft.com/office/powerpoint/2010/main" val="566024030"/>
+      </p:ext>
+    </p:extLst>
+  </p:cSld>
+  <p:clrMapOvr>
+    <a:masterClrMapping/>
+  </p:clrMapOvr>
+</p:sld>
+</file>
+
+<file path=ppt/slides/slide16.xml><?xml version="1.0" encoding="utf-8"?>
+<p:sld xmlns:a="http://schemas.openxmlformats.org/drawingml/2006/main" xmlns:r="http://schemas.openxmlformats.org/officeDocument/2006/relationships" xmlns:p="http://schemas.openxmlformats.org/presentationml/2006/main">
+  <p:cSld>
+    <p:spTree>
+      <p:nvGrpSpPr>
+        <p:cNvPr id="1" name=""/>
+        <p:cNvGrpSpPr/>
+        <p:nvPr/>
+      </p:nvGrpSpPr>
+      <p:grpSpPr>
+        <a:xfrm>
+          <a:off x="0" y="0"/>
+          <a:ext cx="0" cy="0"/>
+          <a:chOff x="0" y="0"/>
+          <a:chExt cx="0" cy="0"/>
+        </a:xfrm>
+      </p:grpSpPr>
+      <p:pic>
+        <p:nvPicPr>
+          <p:cNvPr id="2" name="Picture 1"/>
+          <p:cNvPicPr>
+            <a:picLocks noChangeAspect="1"/>
+          </p:cNvPicPr>
+          <p:nvPr/>
+        </p:nvPicPr>
+        <p:blipFill>
+          <a:blip r:embed="rId2"/>
+          <a:stretch>
+            <a:fillRect/>
+          </a:stretch>
+        </p:blipFill>
+        <p:spPr>
+          <a:xfrm>
+            <a:off x="949214" y="690321"/>
+            <a:ext cx="7826418" cy="5166808"/>
+          </a:xfrm>
+          <a:prstGeom prst="rect">
+            <a:avLst/>
+          </a:prstGeom>
+        </p:spPr>
+      </p:pic>
+    </p:spTree>
+    <p:extLst>
+      <p:ext uri="{BB962C8B-B14F-4D97-AF65-F5344CB8AC3E}">
+        <p14:creationId xmlns:p14="http://schemas.microsoft.com/office/powerpoint/2010/main" val="3237512953"/>
+      </p:ext>
+    </p:extLst>
+  </p:cSld>
+  <p:clrMapOvr>
+    <a:masterClrMapping/>
+  </p:clrMapOvr>
+</p:sld>
+</file>
+
 <file path=ppt/slides/slide2.xml><?xml version="1.0" encoding="utf-8"?>
+<p:sld xmlns:a="http://schemas.openxmlformats.org/drawingml/2006/main" xmlns:r="http://schemas.openxmlformats.org/officeDocument/2006/relationships" xmlns:p="http://schemas.openxmlformats.org/presentationml/2006/main">
+  <p:cSld>
+    <p:spTree>
+      <p:nvGrpSpPr>
+        <p:cNvPr id="1" name=""/>
+        <p:cNvGrpSpPr/>
+        <p:nvPr/>
+      </p:nvGrpSpPr>
+      <p:grpSpPr>
+        <a:xfrm>
+          <a:off x="0" y="0"/>
+          <a:ext cx="0" cy="0"/>
+          <a:chOff x="0" y="0"/>
+          <a:chExt cx="0" cy="0"/>
+        </a:xfrm>
+      </p:grpSpPr>
+      <p:pic>
+        <p:nvPicPr>
+          <p:cNvPr id="4" name="Picture 3"/>
+          <p:cNvPicPr>
+            <a:picLocks noChangeAspect="1"/>
+          </p:cNvPicPr>
+          <p:nvPr/>
+        </p:nvPicPr>
+        <p:blipFill>
+          <a:blip r:embed="rId2"/>
+          <a:stretch>
+            <a:fillRect/>
+          </a:stretch>
+        </p:blipFill>
+        <p:spPr>
+          <a:xfrm>
+            <a:off x="558219" y="1280864"/>
+            <a:ext cx="10875465" cy="5068178"/>
+          </a:xfrm>
+          <a:prstGeom prst="rect">
+            <a:avLst/>
+          </a:prstGeom>
+        </p:spPr>
+      </p:pic>
+      <p:sp>
+        <p:nvSpPr>
+          <p:cNvPr id="5" name="Rounded Rectangle 4"/>
+          <p:cNvSpPr/>
+          <p:nvPr/>
+        </p:nvSpPr>
+        <p:spPr>
+          <a:xfrm>
+            <a:off x="681487" y="690113"/>
+            <a:ext cx="10593238" cy="590751"/>
+          </a:xfrm>
+          <a:prstGeom prst="roundRect">
+            <a:avLst/>
+          </a:prstGeom>
+        </p:spPr>
+        <p:style>
+          <a:lnRef idx="2">
+            <a:schemeClr val="accent1">
+              <a:shade val="50000"/>
+            </a:schemeClr>
+          </a:lnRef>
+          <a:fillRef idx="1">
+            <a:schemeClr val="accent1"/>
+          </a:fillRef>
+          <a:effectRef idx="0">
+            <a:schemeClr val="accent1"/>
+          </a:effectRef>
+          <a:fontRef idx="minor">
+            <a:schemeClr val="lt1"/>
+          </a:fontRef>
+        </p:style>
+        <p:txBody>
+          <a:bodyPr rtlCol="0" anchor="ctr"/>
+          <a:lstStyle/>
+          <a:p>
+            <a:pPr algn="ctr"/>
+            <a:r>
+              <a:rPr lang="en-US" dirty="0" smtClean="0"/>
+              <a:t>Complete Application Architecture</a:t>
+            </a:r>
+            <a:endParaRPr lang="en-US" dirty="0"/>
+          </a:p>
+        </p:txBody>
+      </p:sp>
+    </p:spTree>
+    <p:extLst>
+      <p:ext uri="{BB962C8B-B14F-4D97-AF65-F5344CB8AC3E}">
+        <p14:creationId xmlns:p14="http://schemas.microsoft.com/office/powerpoint/2010/main" val="3514092636"/>
+      </p:ext>
+    </p:extLst>
+  </p:cSld>
+  <p:clrMapOvr>
+    <a:masterClrMapping/>
+  </p:clrMapOvr>
+</p:sld>
+</file>
+
+<file path=ppt/slides/slide3.xml><?xml version="1.0" encoding="utf-8"?>
+<p:sld xmlns:a="http://schemas.openxmlformats.org/drawingml/2006/main" xmlns:r="http://schemas.openxmlformats.org/officeDocument/2006/relationships" xmlns:p="http://schemas.openxmlformats.org/presentationml/2006/main">
+  <p:cSld>
+    <p:spTree>
+      <p:nvGrpSpPr>
+        <p:cNvPr id="1" name=""/>
+        <p:cNvGrpSpPr/>
+        <p:nvPr/>
+      </p:nvGrpSpPr>
+      <p:grpSpPr>
+        <a:xfrm>
+          <a:off x="0" y="0"/>
+          <a:ext cx="0" cy="0"/>
+          <a:chOff x="0" y="0"/>
+          <a:chExt cx="0" cy="0"/>
+        </a:xfrm>
+      </p:grpSpPr>
+      <p:sp>
+        <p:nvSpPr>
+          <p:cNvPr id="3" name="Rounded Rectangle 2"/>
+          <p:cNvSpPr/>
+          <p:nvPr/>
+        </p:nvSpPr>
+        <p:spPr>
+          <a:xfrm>
+            <a:off x="155275" y="1314240"/>
+            <a:ext cx="11734800" cy="724619"/>
+          </a:xfrm>
+          <a:prstGeom prst="roundRect">
+            <a:avLst/>
+          </a:prstGeom>
+          <a:ln>
+            <a:solidFill>
+              <a:srgbClr val="002060"/>
+            </a:solidFill>
+          </a:ln>
+        </p:spPr>
+        <p:style>
+          <a:lnRef idx="2">
+            <a:schemeClr val="accent1">
+              <a:shade val="50000"/>
+            </a:schemeClr>
+          </a:lnRef>
+          <a:fillRef idx="1">
+            <a:schemeClr val="accent1"/>
+          </a:fillRef>
+          <a:effectRef idx="0">
+            <a:schemeClr val="accent1"/>
+          </a:effectRef>
+          <a:fontRef idx="minor">
+            <a:schemeClr val="lt1"/>
+          </a:fontRef>
+        </p:style>
+        <p:txBody>
+          <a:bodyPr rtlCol="0" anchor="ctr"/>
+          <a:lstStyle/>
+          <a:p>
+            <a:pPr algn="ctr"/>
+            <a:r>
+              <a:rPr lang="en-US" smtClean="0"/>
+              <a:t>Case Study Environment </a:t>
+            </a:r>
+            <a:r>
+              <a:rPr lang="en-US" dirty="0" smtClean="0"/>
+              <a:t>Architecture</a:t>
+            </a:r>
+            <a:endParaRPr lang="en-US" dirty="0"/>
+          </a:p>
+        </p:txBody>
+      </p:sp>
+      <p:pic>
+        <p:nvPicPr>
+          <p:cNvPr id="4" name="Picture 3"/>
+          <p:cNvPicPr>
+            <a:picLocks noChangeAspect="1"/>
+          </p:cNvPicPr>
+          <p:nvPr/>
+        </p:nvPicPr>
+        <p:blipFill>
+          <a:blip r:embed="rId2"/>
+          <a:stretch>
+            <a:fillRect/>
+          </a:stretch>
+        </p:blipFill>
+        <p:spPr>
+          <a:xfrm>
+            <a:off x="155275" y="2038859"/>
+            <a:ext cx="11734800" cy="4077843"/>
+          </a:xfrm>
+          <a:prstGeom prst="rect">
+            <a:avLst/>
+          </a:prstGeom>
+          <a:ln>
+            <a:solidFill>
+              <a:srgbClr val="002060"/>
+            </a:solidFill>
+          </a:ln>
+        </p:spPr>
+      </p:pic>
+    </p:spTree>
+    <p:extLst>
+      <p:ext uri="{BB962C8B-B14F-4D97-AF65-F5344CB8AC3E}">
+        <p14:creationId xmlns:p14="http://schemas.microsoft.com/office/powerpoint/2010/main" val="1674033972"/>
+      </p:ext>
+    </p:extLst>
+  </p:cSld>
+  <p:clrMapOvr>
+    <a:masterClrMapping/>
+  </p:clrMapOvr>
+  <p:timing>
+    <p:tnLst>
+      <p:par>
+        <p:cTn id="1" dur="indefinite" restart="never" nodeType="tmRoot"/>
+      </p:par>
+    </p:tnLst>
+  </p:timing>
+</p:sld>
+</file>
+
+<file path=ppt/slides/slide4.xml><?xml version="1.0" encoding="utf-8"?>
 <p:sld xmlns:a="http://schemas.openxmlformats.org/drawingml/2006/main" xmlns:r="http://schemas.openxmlformats.org/officeDocument/2006/relationships" xmlns:p="http://schemas.openxmlformats.org/presentationml/2006/main">
   <p:cSld>
     <p:spTree>
@@ -5936,7 +6569,7 @@
 </p:sld>
 </file>
 
-<file path=ppt/slides/slide3.xml><?xml version="1.0" encoding="utf-8"?>
+<file path=ppt/slides/slide5.xml><?xml version="1.0" encoding="utf-8"?>
 <p:sld xmlns:a="http://schemas.openxmlformats.org/drawingml/2006/main" xmlns:r="http://schemas.openxmlformats.org/officeDocument/2006/relationships" xmlns:p="http://schemas.openxmlformats.org/presentationml/2006/main">
   <p:cSld>
     <p:spTree>
@@ -5990,7 +6623,7 @@
 </p:sld>
 </file>
 
-<file path=ppt/slides/slide4.xml><?xml version="1.0" encoding="utf-8"?>
+<file path=ppt/slides/slide6.xml><?xml version="1.0" encoding="utf-8"?>
 <p:sld xmlns:a="http://schemas.openxmlformats.org/drawingml/2006/main" xmlns:r="http://schemas.openxmlformats.org/officeDocument/2006/relationships" xmlns:p="http://schemas.openxmlformats.org/presentationml/2006/main">
   <p:cSld>
     <p:spTree>
@@ -6035,6 +6668,253 @@
     <p:extLst>
       <p:ext uri="{BB962C8B-B14F-4D97-AF65-F5344CB8AC3E}">
         <p14:creationId xmlns:p14="http://schemas.microsoft.com/office/powerpoint/2010/main" val="3634597854"/>
+      </p:ext>
+    </p:extLst>
+  </p:cSld>
+  <p:clrMapOvr>
+    <a:masterClrMapping/>
+  </p:clrMapOvr>
+</p:sld>
+</file>
+
+<file path=ppt/slides/slide7.xml><?xml version="1.0" encoding="utf-8"?>
+<p:sld xmlns:a="http://schemas.openxmlformats.org/drawingml/2006/main" xmlns:r="http://schemas.openxmlformats.org/officeDocument/2006/relationships" xmlns:p="http://schemas.openxmlformats.org/presentationml/2006/main">
+  <p:cSld>
+    <p:spTree>
+      <p:nvGrpSpPr>
+        <p:cNvPr id="1" name=""/>
+        <p:cNvGrpSpPr/>
+        <p:nvPr/>
+      </p:nvGrpSpPr>
+      <p:grpSpPr>
+        <a:xfrm>
+          <a:off x="0" y="0"/>
+          <a:ext cx="0" cy="0"/>
+          <a:chOff x="0" y="0"/>
+          <a:chExt cx="0" cy="0"/>
+        </a:xfrm>
+      </p:grpSpPr>
+      <p:pic>
+        <p:nvPicPr>
+          <p:cNvPr id="2" name="Picture 1"/>
+          <p:cNvPicPr>
+            <a:picLocks noChangeAspect="1"/>
+          </p:cNvPicPr>
+          <p:nvPr/>
+        </p:nvPicPr>
+        <p:blipFill>
+          <a:blip r:embed="rId2"/>
+          <a:stretch>
+            <a:fillRect/>
+          </a:stretch>
+        </p:blipFill>
+        <p:spPr>
+          <a:xfrm>
+            <a:off x="363043" y="1574685"/>
+            <a:ext cx="10887282" cy="4386168"/>
+          </a:xfrm>
+          <a:prstGeom prst="rect">
+            <a:avLst/>
+          </a:prstGeom>
+        </p:spPr>
+      </p:pic>
+      <p:sp>
+        <p:nvSpPr>
+          <p:cNvPr id="3" name="Rounded Rectangle 2"/>
+          <p:cNvSpPr/>
+          <p:nvPr/>
+        </p:nvSpPr>
+        <p:spPr>
+          <a:xfrm>
+            <a:off x="353683" y="457200"/>
+            <a:ext cx="10877909" cy="1009291"/>
+          </a:xfrm>
+          <a:prstGeom prst="roundRect">
+            <a:avLst/>
+          </a:prstGeom>
+        </p:spPr>
+        <p:style>
+          <a:lnRef idx="2">
+            <a:schemeClr val="accent1">
+              <a:shade val="50000"/>
+            </a:schemeClr>
+          </a:lnRef>
+          <a:fillRef idx="1">
+            <a:schemeClr val="accent1"/>
+          </a:fillRef>
+          <a:effectRef idx="0">
+            <a:schemeClr val="accent1"/>
+          </a:effectRef>
+          <a:fontRef idx="minor">
+            <a:schemeClr val="lt1"/>
+          </a:fontRef>
+        </p:style>
+        <p:txBody>
+          <a:bodyPr rtlCol="0" anchor="ctr"/>
+          <a:lstStyle/>
+          <a:p>
+            <a:r>
+              <a:rPr lang="en-US" b="1"/>
+              <a:t>Implementing event-based communication between microservices (integration events)</a:t>
+            </a:r>
+          </a:p>
+        </p:txBody>
+      </p:sp>
+    </p:spTree>
+    <p:extLst>
+      <p:ext uri="{BB962C8B-B14F-4D97-AF65-F5344CB8AC3E}">
+        <p14:creationId xmlns:p14="http://schemas.microsoft.com/office/powerpoint/2010/main" val="2679076199"/>
+      </p:ext>
+    </p:extLst>
+  </p:cSld>
+  <p:clrMapOvr>
+    <a:masterClrMapping/>
+  </p:clrMapOvr>
+</p:sld>
+</file>
+
+<file path=ppt/slides/slide8.xml><?xml version="1.0" encoding="utf-8"?>
+<p:sld xmlns:a="http://schemas.openxmlformats.org/drawingml/2006/main" xmlns:r="http://schemas.openxmlformats.org/officeDocument/2006/relationships" xmlns:p="http://schemas.openxmlformats.org/presentationml/2006/main">
+  <p:cSld>
+    <p:spTree>
+      <p:nvGrpSpPr>
+        <p:cNvPr id="1" name=""/>
+        <p:cNvGrpSpPr/>
+        <p:nvPr/>
+      </p:nvGrpSpPr>
+      <p:grpSpPr>
+        <a:xfrm>
+          <a:off x="0" y="0"/>
+          <a:ext cx="0" cy="0"/>
+          <a:chOff x="0" y="0"/>
+          <a:chExt cx="0" cy="0"/>
+        </a:xfrm>
+      </p:grpSpPr>
+      <p:pic>
+        <p:nvPicPr>
+          <p:cNvPr id="2" name="Picture 1"/>
+          <p:cNvPicPr>
+            <a:picLocks noChangeAspect="1"/>
+          </p:cNvPicPr>
+          <p:nvPr/>
+        </p:nvPicPr>
+        <p:blipFill>
+          <a:blip r:embed="rId2"/>
+          <a:stretch>
+            <a:fillRect/>
+          </a:stretch>
+        </p:blipFill>
+        <p:spPr>
+          <a:xfrm>
+            <a:off x="1589365" y="2392977"/>
+            <a:ext cx="7788315" cy="3124471"/>
+          </a:xfrm>
+          <a:prstGeom prst="rect">
+            <a:avLst/>
+          </a:prstGeom>
+        </p:spPr>
+      </p:pic>
+      <p:sp>
+        <p:nvSpPr>
+          <p:cNvPr id="3" name="Rounded Rectangle 2"/>
+          <p:cNvSpPr/>
+          <p:nvPr/>
+        </p:nvSpPr>
+        <p:spPr>
+          <a:xfrm>
+            <a:off x="1735347" y="923027"/>
+            <a:ext cx="6271404" cy="1081760"/>
+          </a:xfrm>
+          <a:prstGeom prst="roundRect">
+            <a:avLst/>
+          </a:prstGeom>
+        </p:spPr>
+        <p:style>
+          <a:lnRef idx="2">
+            <a:schemeClr val="accent1">
+              <a:shade val="50000"/>
+            </a:schemeClr>
+          </a:lnRef>
+          <a:fillRef idx="1">
+            <a:schemeClr val="accent1"/>
+          </a:fillRef>
+          <a:effectRef idx="0">
+            <a:schemeClr val="accent1"/>
+          </a:effectRef>
+          <a:fontRef idx="minor">
+            <a:schemeClr val="lt1"/>
+          </a:fontRef>
+        </p:style>
+        <p:txBody>
+          <a:bodyPr rtlCol="0" anchor="ctr"/>
+          <a:lstStyle/>
+          <a:p>
+            <a:pPr algn="ctr"/>
+            <a:r>
+              <a:rPr lang="en-US" b="1"/>
+              <a:t>The event bus</a:t>
+            </a:r>
+          </a:p>
+        </p:txBody>
+      </p:sp>
+    </p:spTree>
+    <p:extLst>
+      <p:ext uri="{BB962C8B-B14F-4D97-AF65-F5344CB8AC3E}">
+        <p14:creationId xmlns:p14="http://schemas.microsoft.com/office/powerpoint/2010/main" val="3772707516"/>
+      </p:ext>
+    </p:extLst>
+  </p:cSld>
+  <p:clrMapOvr>
+    <a:masterClrMapping/>
+  </p:clrMapOvr>
+</p:sld>
+</file>
+
+<file path=ppt/slides/slide9.xml><?xml version="1.0" encoding="utf-8"?>
+<p:sld xmlns:a="http://schemas.openxmlformats.org/drawingml/2006/main" xmlns:r="http://schemas.openxmlformats.org/officeDocument/2006/relationships" xmlns:p="http://schemas.openxmlformats.org/presentationml/2006/main">
+  <p:cSld>
+    <p:spTree>
+      <p:nvGrpSpPr>
+        <p:cNvPr id="1" name=""/>
+        <p:cNvGrpSpPr/>
+        <p:nvPr/>
+      </p:nvGrpSpPr>
+      <p:grpSpPr>
+        <a:xfrm>
+          <a:off x="0" y="0"/>
+          <a:ext cx="0" cy="0"/>
+          <a:chOff x="0" y="0"/>
+          <a:chExt cx="0" cy="0"/>
+        </a:xfrm>
+      </p:grpSpPr>
+      <p:pic>
+        <p:nvPicPr>
+          <p:cNvPr id="2" name="Picture 1"/>
+          <p:cNvPicPr>
+            <a:picLocks noChangeAspect="1"/>
+          </p:cNvPicPr>
+          <p:nvPr/>
+        </p:nvPicPr>
+        <p:blipFill>
+          <a:blip r:embed="rId2"/>
+          <a:stretch>
+            <a:fillRect/>
+          </a:stretch>
+        </p:blipFill>
+        <p:spPr>
+          <a:xfrm>
+            <a:off x="2865540" y="1646246"/>
+            <a:ext cx="4906860" cy="3908854"/>
+          </a:xfrm>
+          <a:prstGeom prst="rect">
+            <a:avLst/>
+          </a:prstGeom>
+        </p:spPr>
+      </p:pic>
+    </p:spTree>
+    <p:extLst>
+      <p:ext uri="{BB962C8B-B14F-4D97-AF65-F5344CB8AC3E}">
+        <p14:creationId xmlns:p14="http://schemas.microsoft.com/office/powerpoint/2010/main" val="3490535282"/>
       </p:ext>
     </p:extLst>
   </p:cSld>

</xml_diff>